<commit_message>
Edit ReadME and partial of Connectors PPT
</commit_message>
<xml_diff>
--- a/Creating you first bot.pptx
+++ b/Creating you first bot.pptx
@@ -9,10 +9,10 @@
     <p:sldMasterId id="2147484317" r:id="rId8"/>
   </p:sldMasterIdLst>
   <p:notesMasterIdLst>
-    <p:notesMasterId r:id="rId27"/>
+    <p:notesMasterId r:id="rId28"/>
   </p:notesMasterIdLst>
   <p:handoutMasterIdLst>
-    <p:handoutMasterId r:id="rId28"/>
+    <p:handoutMasterId r:id="rId29"/>
   </p:handoutMasterIdLst>
   <p:sldIdLst>
     <p:sldId id="1399" r:id="rId9"/>
@@ -30,9 +30,10 @@
     <p:sldId id="1408" r:id="rId21"/>
     <p:sldId id="1409" r:id="rId22"/>
     <p:sldId id="1410" r:id="rId23"/>
-    <p:sldId id="1396" r:id="rId24"/>
-    <p:sldId id="1326" r:id="rId25"/>
-    <p:sldId id="1395" r:id="rId26"/>
+    <p:sldId id="1411" r:id="rId24"/>
+    <p:sldId id="1396" r:id="rId25"/>
+    <p:sldId id="1326" r:id="rId26"/>
+    <p:sldId id="1395" r:id="rId27"/>
   </p:sldIdLst>
   <p:sldSz cx="12436475" cy="6994525"/>
   <p:notesSz cx="6858000" cy="9144000"/>
@@ -151,6 +152,7 @@
             <p14:sldId id="1408"/>
             <p14:sldId id="1409"/>
             <p14:sldId id="1410"/>
+            <p14:sldId id="1411"/>
             <p14:sldId id="1396"/>
             <p14:sldId id="1326"/>
             <p14:sldId id="1395"/>
@@ -281,7 +283,7 @@
               <a:rPr lang="en-US" smtClean="0">
                 <a:latin typeface="Segoe UI" pitchFamily="34" charset="0"/>
               </a:rPr>
-              <a:t>10/16/2016 10:23 PM</a:t>
+              <a:t>10/16/2016 11:50 PM</a:t>
             </a:fld>
             <a:endParaRPr lang="en-US" dirty="0">
               <a:latin typeface="Segoe UI" pitchFamily="34" charset="0"/>
@@ -559,7 +561,7 @@
           <a:p>
             <a:fld id="{79C601B9-5273-467A-8E48-EC9939578C8F}" type="datetime8">
               <a:rPr lang="en-US" smtClean="0"/>
-              <a:t>10/16/2016 10:22 PM</a:t>
+              <a:t>10/16/2016 11:50 PM</a:t>
             </a:fld>
             <a:endParaRPr lang="en-US" dirty="0"/>
           </a:p>
@@ -946,7 +948,7 @@
           <a:p>
             <a:fld id="{79C601B9-5273-467A-8E48-EC9939578C8F}" type="datetime8">
               <a:rPr lang="en-US" smtClean="0"/>
-              <a:t>10/16/2016 10:22 PM</a:t>
+              <a:t>10/16/2016 11:50 PM</a:t>
             </a:fld>
             <a:endParaRPr lang="en-US" dirty="0"/>
           </a:p>
@@ -1131,7 +1133,7 @@
           <a:p>
             <a:fld id="{79C601B9-5273-467A-8E48-EC9939578C8F}" type="datetime8">
               <a:rPr lang="en-US" smtClean="0"/>
-              <a:t>10/16/2016 10:22 PM</a:t>
+              <a:t>10/16/2016 11:50 PM</a:t>
             </a:fld>
             <a:endParaRPr lang="en-US" dirty="0"/>
           </a:p>
@@ -1316,7 +1318,7 @@
           <a:p>
             <a:fld id="{79C601B9-5273-467A-8E48-EC9939578C8F}" type="datetime8">
               <a:rPr lang="en-US" smtClean="0"/>
-              <a:t>10/16/2016 10:22 PM</a:t>
+              <a:t>10/16/2016 11:50 PM</a:t>
             </a:fld>
             <a:endParaRPr lang="en-US" dirty="0"/>
           </a:p>
@@ -1424,7 +1426,7 @@
           <a:p>
             <a:fld id="{A4F0ACD4-D3EE-44A8-9E50-40104FBD42A9}" type="slidenum">
               <a:rPr lang="en-GB" smtClean="0"/>
-              <a:t>16</a:t>
+              <a:t>17</a:t>
             </a:fld>
             <a:endParaRPr lang="en-GB" dirty="0"/>
           </a:p>
@@ -1550,7 +1552,7 @@
                   <a:prstClr val="black"/>
                 </a:solidFill>
               </a:rPr>
-              <a:t>10/16/2016 10:22 PM</a:t>
+              <a:t>10/16/2016 11:50 PM</a:t>
             </a:fld>
             <a:endParaRPr lang="en-US" dirty="0">
               <a:solidFill>
@@ -1582,7 +1584,7 @@
                 </a:solidFill>
               </a:rPr>
               <a:pPr/>
-              <a:t>17</a:t>
+              <a:t>18</a:t>
             </a:fld>
             <a:endParaRPr lang="en-US" dirty="0">
               <a:solidFill>
@@ -1724,7 +1726,7 @@
           <a:p>
             <a:fld id="{A4F0ACD4-D3EE-44A8-9E50-40104FBD42A9}" type="slidenum">
               <a:rPr lang="en-GB" smtClean="0"/>
-              <a:t>18</a:t>
+              <a:t>19</a:t>
             </a:fld>
             <a:endParaRPr lang="en-GB" dirty="0"/>
           </a:p>
@@ -28408,7 +28410,7 @@
           <a:p>
             <a:r>
               <a:rPr lang="pt-BR" dirty="0"/>
-              <a:t>DEMO – </a:t>
+              <a:t>DEMO 3 – </a:t>
             </a:r>
             <a:r>
               <a:rPr lang="pt-BR" dirty="0" err="1"/>
@@ -28517,6 +28519,110 @@
       </p:grpSpPr>
       <p:sp>
         <p:nvSpPr>
+          <p:cNvPr id="2" name="Título 1"/>
+          <p:cNvSpPr>
+            <a:spLocks noGrp="1"/>
+          </p:cNvSpPr>
+          <p:nvPr>
+            <p:ph type="title"/>
+          </p:nvPr>
+        </p:nvSpPr>
+        <p:spPr/>
+        <p:txBody>
+          <a:bodyPr/>
+          <a:lstStyle/>
+          <a:p>
+            <a:r>
+              <a:rPr lang="pt-BR" dirty="0"/>
+              <a:t>DEMO 4 – </a:t>
+            </a:r>
+            <a:r>
+              <a:rPr lang="pt-BR" dirty="0" err="1"/>
+              <a:t>Testing</a:t>
+            </a:r>
+            <a:r>
+              <a:rPr lang="pt-BR" dirty="0"/>
+              <a:t> </a:t>
+            </a:r>
+            <a:r>
+              <a:rPr lang="pt-BR" dirty="0" err="1"/>
+              <a:t>your</a:t>
+            </a:r>
+            <a:r>
+              <a:rPr lang="pt-BR" dirty="0"/>
+              <a:t> </a:t>
+            </a:r>
+            <a:r>
+              <a:rPr lang="pt-BR" dirty="0" err="1"/>
+              <a:t>bot</a:t>
+            </a:r>
+            <a:endParaRPr lang="en-US" dirty="0"/>
+          </a:p>
+        </p:txBody>
+      </p:sp>
+      <p:sp>
+        <p:nvSpPr>
+          <p:cNvPr id="3" name="Espaço Reservado para Texto 2"/>
+          <p:cNvSpPr>
+            <a:spLocks noGrp="1"/>
+          </p:cNvSpPr>
+          <p:nvPr>
+            <p:ph type="body" sz="quarter" idx="12"/>
+          </p:nvPr>
+        </p:nvSpPr>
+        <p:spPr/>
+        <p:txBody>
+          <a:bodyPr/>
+          <a:lstStyle/>
+          <a:p>
+            <a:endParaRPr lang="en-US"/>
+          </a:p>
+        </p:txBody>
+      </p:sp>
+    </p:spTree>
+    <p:extLst>
+      <p:ext uri="{BB962C8B-B14F-4D97-AF65-F5344CB8AC3E}">
+        <p14:creationId xmlns:p14="http://schemas.microsoft.com/office/powerpoint/2010/main" val="2937080435"/>
+      </p:ext>
+    </p:extLst>
+  </p:cSld>
+  <p:clrMapOvr>
+    <a:masterClrMapping/>
+  </p:clrMapOvr>
+  <mc:AlternateContent xmlns:mc="http://schemas.openxmlformats.org/markup-compatibility/2006" xmlns:p14="http://schemas.microsoft.com/office/powerpoint/2010/main">
+    <mc:Choice Requires="p14">
+      <p:transition spd="slow" p14:dur="3400">
+        <p14:reveal/>
+      </p:transition>
+    </mc:Choice>
+    <mc:Fallback xmlns="">
+      <p:transition spd="slow">
+        <p:fade/>
+      </p:transition>
+    </mc:Fallback>
+  </mc:AlternateContent>
+</p:sld>
+</file>
+
+<file path=ppt/slides/slide17.xml><?xml version="1.0" encoding="utf-8"?>
+<p:sld xmlns:a="http://schemas.openxmlformats.org/drawingml/2006/main" xmlns:r="http://schemas.openxmlformats.org/officeDocument/2006/relationships" xmlns:p="http://schemas.openxmlformats.org/presentationml/2006/main">
+  <p:cSld>
+    <p:spTree>
+      <p:nvGrpSpPr>
+        <p:cNvPr id="1" name=""/>
+        <p:cNvGrpSpPr/>
+        <p:nvPr/>
+      </p:nvGrpSpPr>
+      <p:grpSpPr>
+        <a:xfrm>
+          <a:off x="0" y="0"/>
+          <a:ext cx="0" cy="0"/>
+          <a:chOff x="0" y="0"/>
+          <a:chExt cx="0" cy="0"/>
+        </a:xfrm>
+      </p:grpSpPr>
+      <p:sp>
+        <p:nvSpPr>
           <p:cNvPr id="9" name="TextBox 8"/>
           <p:cNvSpPr txBox="1"/>
           <p:nvPr/>
@@ -28611,7 +28717,7 @@
 </p:sld>
 </file>
 
-<file path=ppt/slides/slide17.xml><?xml version="1.0" encoding="utf-8"?>
+<file path=ppt/slides/slide18.xml><?xml version="1.0" encoding="utf-8"?>
 <p:sld xmlns:a="http://schemas.openxmlformats.org/drawingml/2006/main" xmlns:r="http://schemas.openxmlformats.org/officeDocument/2006/relationships" xmlns:p="http://schemas.openxmlformats.org/presentationml/2006/main">
   <p:cSld>
     <p:spTree>
@@ -28653,7 +28759,7 @@
 </p:sld>
 </file>
 
-<file path=ppt/slides/slide18.xml><?xml version="1.0" encoding="utf-8"?>
+<file path=ppt/slides/slide19.xml><?xml version="1.0" encoding="utf-8"?>
 <p:sld xmlns:a="http://schemas.openxmlformats.org/drawingml/2006/main" xmlns:r="http://schemas.openxmlformats.org/officeDocument/2006/relationships" xmlns:p="http://schemas.openxmlformats.org/presentationml/2006/main">
   <p:cSld>
     <p:spTree>

</xml_diff>